<commit_message>
Finished w7, fixed exporting logic
</commit_message>
<xml_diff>
--- a/Viz.pptx
+++ b/Viz.pptx
@@ -5,7 +5,7 @@
     <p:sldMasterId id="2147483648" r:id="rId1"/>
   </p:sldMasterIdLst>
   <p:notesMasterIdLst>
-    <p:notesMasterId r:id="rId7"/>
+    <p:notesMasterId r:id="rId8"/>
   </p:notesMasterIdLst>
   <p:sldIdLst>
     <p:sldId id="256" r:id="rId2"/>
@@ -13,6 +13,7 @@
     <p:sldId id="258" r:id="rId4"/>
     <p:sldId id="259" r:id="rId5"/>
     <p:sldId id="260" r:id="rId6"/>
+    <p:sldId id="261" r:id="rId7"/>
   </p:sldIdLst>
   <p:sldSz cx="12192000" cy="6858000"/>
   <p:notesSz cx="6858000" cy="9144000"/>
@@ -123,6 +124,7 @@
 <p1510:revInfo xmlns:a="http://schemas.openxmlformats.org/drawingml/2006/main" xmlns:r="http://schemas.openxmlformats.org/officeDocument/2006/relationships" xmlns:p1510="http://schemas.microsoft.com/office/powerpoint/2015/10/main">
   <p1510:revLst>
     <p1510:client id="{5F315C37-A57A-4B13-A8EF-FA31EC78C459}" v="11" dt="2026-01-31T21:57:31.939"/>
+    <p1510:client id="{DC55FABE-5E4A-49A4-80C7-7195C027F1C1}" v="32" dt="2026-02-01T08:39:21.043"/>
   </p1510:revLst>
 </p1510:revInfo>
 </file>
@@ -292,7 +294,7 @@
   <pc:docChgLst>
     <pc:chgData name="Or Forshmit" userId="7c842d5c4cf4431e" providerId="LiveId" clId="{3E18CC7B-CFC1-4E27-A1BD-24931C36162E}"/>
     <pc:docChg chg="undo custSel addSld modSld">
-      <pc:chgData name="Or Forshmit" userId="7c842d5c4cf4431e" providerId="LiveId" clId="{3E18CC7B-CFC1-4E27-A1BD-24931C36162E}" dt="2026-01-31T22:04:45.036" v="581" actId="14100"/>
+      <pc:chgData name="Or Forshmit" userId="7c842d5c4cf4431e" providerId="LiveId" clId="{3E18CC7B-CFC1-4E27-A1BD-24931C36162E}" dt="2026-02-01T08:39:31.945" v="781" actId="1076"/>
       <pc:docMkLst>
         <pc:docMk/>
       </pc:docMkLst>
@@ -667,102 +669,6 @@
           <pc:docMk/>
           <pc:sldMk cId="2855367001" sldId="259"/>
         </pc:sldMkLst>
-        <pc:spChg chg="del">
-          <ac:chgData name="Or Forshmit" userId="7c842d5c4cf4431e" providerId="LiveId" clId="{3E18CC7B-CFC1-4E27-A1BD-24931C36162E}" dt="2026-01-30T16:04:35.382" v="355" actId="478"/>
-          <ac:spMkLst>
-            <pc:docMk/>
-            <pc:sldMk cId="2855367001" sldId="259"/>
-            <ac:spMk id="2" creationId="{39D59231-971E-B95F-4D3C-B8EABFF52340}"/>
-          </ac:spMkLst>
-        </pc:spChg>
-        <pc:spChg chg="del">
-          <ac:chgData name="Or Forshmit" userId="7c842d5c4cf4431e" providerId="LiveId" clId="{3E18CC7B-CFC1-4E27-A1BD-24931C36162E}" dt="2026-01-30T16:04:35.382" v="355" actId="478"/>
-          <ac:spMkLst>
-            <pc:docMk/>
-            <pc:sldMk cId="2855367001" sldId="259"/>
-            <ac:spMk id="3" creationId="{AD408BC3-27EA-711D-07A7-21229032017D}"/>
-          </ac:spMkLst>
-        </pc:spChg>
-        <pc:spChg chg="del">
-          <ac:chgData name="Or Forshmit" userId="7c842d5c4cf4431e" providerId="LiveId" clId="{3E18CC7B-CFC1-4E27-A1BD-24931C36162E}" dt="2026-01-30T16:04:35.382" v="355" actId="478"/>
-          <ac:spMkLst>
-            <pc:docMk/>
-            <pc:sldMk cId="2855367001" sldId="259"/>
-            <ac:spMk id="4" creationId="{03480C0B-B77B-22FA-B0C4-31B2BD7B6303}"/>
-          </ac:spMkLst>
-        </pc:spChg>
-        <pc:spChg chg="del">
-          <ac:chgData name="Or Forshmit" userId="7c842d5c4cf4431e" providerId="LiveId" clId="{3E18CC7B-CFC1-4E27-A1BD-24931C36162E}" dt="2026-01-30T16:04:35.382" v="355" actId="478"/>
-          <ac:spMkLst>
-            <pc:docMk/>
-            <pc:sldMk cId="2855367001" sldId="259"/>
-            <ac:spMk id="7" creationId="{A9EFFD95-0F39-141A-3187-2C843AF41B16}"/>
-          </ac:spMkLst>
-        </pc:spChg>
-        <pc:spChg chg="del">
-          <ac:chgData name="Or Forshmit" userId="7c842d5c4cf4431e" providerId="LiveId" clId="{3E18CC7B-CFC1-4E27-A1BD-24931C36162E}" dt="2026-01-30T16:04:35.382" v="355" actId="478"/>
-          <ac:spMkLst>
-            <pc:docMk/>
-            <pc:sldMk cId="2855367001" sldId="259"/>
-            <ac:spMk id="8" creationId="{FDBA7B0C-65A5-4B32-A544-530845AE3652}"/>
-          </ac:spMkLst>
-        </pc:spChg>
-        <pc:spChg chg="del">
-          <ac:chgData name="Or Forshmit" userId="7c842d5c4cf4431e" providerId="LiveId" clId="{3E18CC7B-CFC1-4E27-A1BD-24931C36162E}" dt="2026-01-30T16:04:35.382" v="355" actId="478"/>
-          <ac:spMkLst>
-            <pc:docMk/>
-            <pc:sldMk cId="2855367001" sldId="259"/>
-            <ac:spMk id="9" creationId="{19BE8C64-788D-3389-6BB3-FCD3233CB737}"/>
-          </ac:spMkLst>
-        </pc:spChg>
-        <pc:spChg chg="del">
-          <ac:chgData name="Or Forshmit" userId="7c842d5c4cf4431e" providerId="LiveId" clId="{3E18CC7B-CFC1-4E27-A1BD-24931C36162E}" dt="2026-01-30T16:04:32.670" v="354" actId="478"/>
-          <ac:spMkLst>
-            <pc:docMk/>
-            <pc:sldMk cId="2855367001" sldId="259"/>
-            <ac:spMk id="12" creationId="{4404E2DE-A10A-946B-BC52-7D6AB06F5082}"/>
-          </ac:spMkLst>
-        </pc:spChg>
-        <pc:spChg chg="del">
-          <ac:chgData name="Or Forshmit" userId="7c842d5c4cf4431e" providerId="LiveId" clId="{3E18CC7B-CFC1-4E27-A1BD-24931C36162E}" dt="2026-01-30T16:04:32.670" v="354" actId="478"/>
-          <ac:spMkLst>
-            <pc:docMk/>
-            <pc:sldMk cId="2855367001" sldId="259"/>
-            <ac:spMk id="13" creationId="{6C274233-58FA-DF71-2DEA-8133DB7C9C9C}"/>
-          </ac:spMkLst>
-        </pc:spChg>
-        <pc:spChg chg="del">
-          <ac:chgData name="Or Forshmit" userId="7c842d5c4cf4431e" providerId="LiveId" clId="{3E18CC7B-CFC1-4E27-A1BD-24931C36162E}" dt="2026-01-30T16:04:32.670" v="354" actId="478"/>
-          <ac:spMkLst>
-            <pc:docMk/>
-            <pc:sldMk cId="2855367001" sldId="259"/>
-            <ac:spMk id="14" creationId="{F2FF2FCC-1A4F-0D2A-5F21-30CB3B3E6BFD}"/>
-          </ac:spMkLst>
-        </pc:spChg>
-        <pc:spChg chg="del">
-          <ac:chgData name="Or Forshmit" userId="7c842d5c4cf4431e" providerId="LiveId" clId="{3E18CC7B-CFC1-4E27-A1BD-24931C36162E}" dt="2026-01-30T16:04:32.670" v="354" actId="478"/>
-          <ac:spMkLst>
-            <pc:docMk/>
-            <pc:sldMk cId="2855367001" sldId="259"/>
-            <ac:spMk id="18" creationId="{C74EB911-9DDF-E462-9593-983F96C49541}"/>
-          </ac:spMkLst>
-        </pc:spChg>
-        <pc:spChg chg="del">
-          <ac:chgData name="Or Forshmit" userId="7c842d5c4cf4431e" providerId="LiveId" clId="{3E18CC7B-CFC1-4E27-A1BD-24931C36162E}" dt="2026-01-30T16:04:32.670" v="354" actId="478"/>
-          <ac:spMkLst>
-            <pc:docMk/>
-            <pc:sldMk cId="2855367001" sldId="259"/>
-            <ac:spMk id="19" creationId="{2BCAD77A-2765-B524-1FAE-FDA27A5644A9}"/>
-          </ac:spMkLst>
-        </pc:spChg>
-        <pc:spChg chg="del">
-          <ac:chgData name="Or Forshmit" userId="7c842d5c4cf4431e" providerId="LiveId" clId="{3E18CC7B-CFC1-4E27-A1BD-24931C36162E}" dt="2026-01-30T16:04:32.670" v="354" actId="478"/>
-          <ac:spMkLst>
-            <pc:docMk/>
-            <pc:sldMk cId="2855367001" sldId="259"/>
-            <ac:spMk id="20" creationId="{9DC5FC40-9E48-CD5E-1B63-ED69A4281E1E}"/>
-          </ac:spMkLst>
-        </pc:spChg>
         <pc:spChg chg="add mod">
           <ac:chgData name="Or Forshmit" userId="7c842d5c4cf4431e" providerId="LiveId" clId="{3E18CC7B-CFC1-4E27-A1BD-24931C36162E}" dt="2026-01-30T16:09:18.989" v="554" actId="1038"/>
           <ac:spMkLst>
@@ -779,60 +685,12 @@
             <ac:spMk id="27" creationId="{CB2624AE-4601-F9FF-6BD4-6022A4885553}"/>
           </ac:spMkLst>
         </pc:spChg>
-        <pc:cxnChg chg="del">
-          <ac:chgData name="Or Forshmit" userId="7c842d5c4cf4431e" providerId="LiveId" clId="{3E18CC7B-CFC1-4E27-A1BD-24931C36162E}" dt="2026-01-30T16:04:32.670" v="354" actId="478"/>
-          <ac:cxnSpMkLst>
-            <pc:docMk/>
-            <pc:sldMk cId="2855367001" sldId="259"/>
-            <ac:cxnSpMk id="10" creationId="{FE071629-74ED-BEA2-D35C-7D9A16A7C8B6}"/>
-          </ac:cxnSpMkLst>
-        </pc:cxnChg>
-        <pc:cxnChg chg="del">
-          <ac:chgData name="Or Forshmit" userId="7c842d5c4cf4431e" providerId="LiveId" clId="{3E18CC7B-CFC1-4E27-A1BD-24931C36162E}" dt="2026-01-30T16:04:32.670" v="354" actId="478"/>
-          <ac:cxnSpMkLst>
-            <pc:docMk/>
-            <pc:sldMk cId="2855367001" sldId="259"/>
-            <ac:cxnSpMk id="11" creationId="{04699B80-3A0A-199A-5D1A-C4AE8B120FE2}"/>
-          </ac:cxnSpMkLst>
-        </pc:cxnChg>
         <pc:cxnChg chg="add mod">
           <ac:chgData name="Or Forshmit" userId="7c842d5c4cf4431e" providerId="LiveId" clId="{3E18CC7B-CFC1-4E27-A1BD-24931C36162E}" dt="2026-01-30T16:08:50.569" v="509" actId="1076"/>
           <ac:cxnSpMkLst>
             <pc:docMk/>
             <pc:sldMk cId="2855367001" sldId="259"/>
             <ac:cxnSpMk id="16" creationId="{66F98465-231D-7B9E-6F08-4EAF9DB46A8D}"/>
-          </ac:cxnSpMkLst>
-        </pc:cxnChg>
-        <pc:cxnChg chg="add mod">
-          <ac:chgData name="Or Forshmit" userId="7c842d5c4cf4431e" providerId="LiveId" clId="{3E18CC7B-CFC1-4E27-A1BD-24931C36162E}" dt="2026-01-30T16:05:13.758" v="366"/>
-          <ac:cxnSpMkLst>
-            <pc:docMk/>
-            <pc:sldMk cId="2855367001" sldId="259"/>
-            <ac:cxnSpMk id="17" creationId="{2EC11EF7-F071-DF71-B17A-224D86064477}"/>
-          </ac:cxnSpMkLst>
-        </pc:cxnChg>
-        <pc:cxnChg chg="add mod">
-          <ac:chgData name="Or Forshmit" userId="7c842d5c4cf4431e" providerId="LiveId" clId="{3E18CC7B-CFC1-4E27-A1BD-24931C36162E}" dt="2026-01-30T16:05:12.410" v="364"/>
-          <ac:cxnSpMkLst>
-            <pc:docMk/>
-            <pc:sldMk cId="2855367001" sldId="259"/>
-            <ac:cxnSpMk id="21" creationId="{BFDAF42F-914F-9D6C-9753-810B3628659F}"/>
-          </ac:cxnSpMkLst>
-        </pc:cxnChg>
-        <pc:cxnChg chg="add del mod">
-          <ac:chgData name="Or Forshmit" userId="7c842d5c4cf4431e" providerId="LiveId" clId="{3E18CC7B-CFC1-4E27-A1BD-24931C36162E}" dt="2026-01-30T16:05:32.082" v="433" actId="478"/>
-          <ac:cxnSpMkLst>
-            <pc:docMk/>
-            <pc:sldMk cId="2855367001" sldId="259"/>
-            <ac:cxnSpMk id="22" creationId="{1C90ADFB-B48C-95CB-7F7B-39DD760930DA}"/>
-          </ac:cxnSpMkLst>
-        </pc:cxnChg>
-        <pc:cxnChg chg="add del mod">
-          <ac:chgData name="Or Forshmit" userId="7c842d5c4cf4431e" providerId="LiveId" clId="{3E18CC7B-CFC1-4E27-A1BD-24931C36162E}" dt="2026-01-30T16:05:34.863" v="434" actId="478"/>
-          <ac:cxnSpMkLst>
-            <pc:docMk/>
-            <pc:sldMk cId="2855367001" sldId="259"/>
-            <ac:cxnSpMk id="23" creationId="{54E0BB9A-4375-9920-3AD4-FDF7801CCA7E}"/>
           </ac:cxnSpMkLst>
         </pc:cxnChg>
         <pc:cxnChg chg="add mod">
@@ -944,6 +802,213 @@
             <pc:docMk/>
             <pc:sldMk cId="1068988793" sldId="260"/>
             <ac:cxnSpMk id="27" creationId="{5F632C4C-55A9-EB56-55AC-AF11608DE7FE}"/>
+          </ac:cxnSpMkLst>
+        </pc:cxnChg>
+      </pc:sldChg>
+      <pc:sldChg chg="addSp delSp modSp add mod modNotesTx">
+        <pc:chgData name="Or Forshmit" userId="7c842d5c4cf4431e" providerId="LiveId" clId="{3E18CC7B-CFC1-4E27-A1BD-24931C36162E}" dt="2026-02-01T08:39:31.945" v="781" actId="1076"/>
+        <pc:sldMkLst>
+          <pc:docMk/>
+          <pc:sldMk cId="4249282133" sldId="261"/>
+        </pc:sldMkLst>
+        <pc:spChg chg="add del">
+          <ac:chgData name="Or Forshmit" userId="7c842d5c4cf4431e" providerId="LiveId" clId="{3E18CC7B-CFC1-4E27-A1BD-24931C36162E}" dt="2026-02-01T08:35:11.032" v="609" actId="11529"/>
+          <ac:spMkLst>
+            <pc:docMk/>
+            <pc:sldMk cId="4249282133" sldId="261"/>
+            <ac:spMk id="2" creationId="{CBFBD247-8D19-80B9-9E57-26C4F6C72A23}"/>
+          </ac:spMkLst>
+        </pc:spChg>
+        <pc:spChg chg="add mod">
+          <ac:chgData name="Or Forshmit" userId="7c842d5c4cf4431e" providerId="LiveId" clId="{3E18CC7B-CFC1-4E27-A1BD-24931C36162E}" dt="2026-02-01T08:35:27.956" v="613" actId="1076"/>
+          <ac:spMkLst>
+            <pc:docMk/>
+            <pc:sldMk cId="4249282133" sldId="261"/>
+            <ac:spMk id="3" creationId="{052DFC8D-32F6-A5C1-A454-C8B6860161DF}"/>
+          </ac:spMkLst>
+        </pc:spChg>
+        <pc:spChg chg="add del mod">
+          <ac:chgData name="Or Forshmit" userId="7c842d5c4cf4431e" providerId="LiveId" clId="{3E18CC7B-CFC1-4E27-A1BD-24931C36162E}" dt="2026-02-01T08:36:04.378" v="631" actId="1076"/>
+          <ac:spMkLst>
+            <pc:docMk/>
+            <pc:sldMk cId="4249282133" sldId="261"/>
+            <ac:spMk id="4" creationId="{3154E2B7-F23E-C180-30D3-70869CB77FFB}"/>
+          </ac:spMkLst>
+        </pc:spChg>
+        <pc:spChg chg="add mod">
+          <ac:chgData name="Or Forshmit" userId="7c842d5c4cf4431e" providerId="LiveId" clId="{3E18CC7B-CFC1-4E27-A1BD-24931C36162E}" dt="2026-02-01T08:36:12.097" v="633" actId="1076"/>
+          <ac:spMkLst>
+            <pc:docMk/>
+            <pc:sldMk cId="4249282133" sldId="261"/>
+            <ac:spMk id="5" creationId="{EC822FD2-F493-8A34-F8AF-F0FF9D7F09F4}"/>
+          </ac:spMkLst>
+        </pc:spChg>
+        <pc:spChg chg="add mod">
+          <ac:chgData name="Or Forshmit" userId="7c842d5c4cf4431e" providerId="LiveId" clId="{3E18CC7B-CFC1-4E27-A1BD-24931C36162E}" dt="2026-02-01T08:36:12.097" v="633" actId="1076"/>
+          <ac:spMkLst>
+            <pc:docMk/>
+            <pc:sldMk cId="4249282133" sldId="261"/>
+            <ac:spMk id="8" creationId="{352C131C-22DA-F665-9F95-91F76FAD1C45}"/>
+          </ac:spMkLst>
+        </pc:spChg>
+        <pc:spChg chg="add mod">
+          <ac:chgData name="Or Forshmit" userId="7c842d5c4cf4431e" providerId="LiveId" clId="{3E18CC7B-CFC1-4E27-A1BD-24931C36162E}" dt="2026-02-01T08:36:36.672" v="672" actId="1038"/>
+          <ac:spMkLst>
+            <pc:docMk/>
+            <pc:sldMk cId="4249282133" sldId="261"/>
+            <ac:spMk id="9" creationId="{E3426335-B74B-87DD-88FC-0A1FBEA774FD}"/>
+          </ac:spMkLst>
+        </pc:spChg>
+        <pc:spChg chg="add del mod">
+          <ac:chgData name="Or Forshmit" userId="7c842d5c4cf4431e" providerId="LiveId" clId="{3E18CC7B-CFC1-4E27-A1BD-24931C36162E}" dt="2026-02-01T08:36:41.244" v="676"/>
+          <ac:spMkLst>
+            <pc:docMk/>
+            <pc:sldMk cId="4249282133" sldId="261"/>
+            <ac:spMk id="10" creationId="{2476DA24-9F5E-D280-0CF8-B662579E9049}"/>
+          </ac:spMkLst>
+        </pc:spChg>
+        <pc:spChg chg="del">
+          <ac:chgData name="Or Forshmit" userId="7c842d5c4cf4431e" providerId="LiveId" clId="{3E18CC7B-CFC1-4E27-A1BD-24931C36162E}" dt="2026-02-01T08:35:02.915" v="607" actId="478"/>
+          <ac:spMkLst>
+            <pc:docMk/>
+            <pc:sldMk cId="4249282133" sldId="261"/>
+            <ac:spMk id="11" creationId="{59FA3D77-9C19-2DE4-AEE8-D20FB166F331}"/>
+          </ac:spMkLst>
+        </pc:spChg>
+        <pc:spChg chg="del">
+          <ac:chgData name="Or Forshmit" userId="7c842d5c4cf4431e" providerId="LiveId" clId="{3E18CC7B-CFC1-4E27-A1BD-24931C36162E}" dt="2026-02-01T08:35:02.915" v="607" actId="478"/>
+          <ac:spMkLst>
+            <pc:docMk/>
+            <pc:sldMk cId="4249282133" sldId="261"/>
+            <ac:spMk id="12" creationId="{E95EB174-DA33-1B9C-001A-5C35AC2A465C}"/>
+          </ac:spMkLst>
+        </pc:spChg>
+        <pc:spChg chg="add mod">
+          <ac:chgData name="Or Forshmit" userId="7c842d5c4cf4431e" providerId="LiveId" clId="{3E18CC7B-CFC1-4E27-A1BD-24931C36162E}" dt="2026-02-01T08:37:36.369" v="695" actId="20577"/>
+          <ac:spMkLst>
+            <pc:docMk/>
+            <pc:sldMk cId="4249282133" sldId="261"/>
+            <ac:spMk id="15" creationId="{E205881D-DE3B-51AD-746A-6E578C0F95C0}"/>
+          </ac:spMkLst>
+        </pc:spChg>
+        <pc:spChg chg="add mod">
+          <ac:chgData name="Or Forshmit" userId="7c842d5c4cf4431e" providerId="LiveId" clId="{3E18CC7B-CFC1-4E27-A1BD-24931C36162E}" dt="2026-02-01T08:38:07.048" v="704" actId="1076"/>
+          <ac:spMkLst>
+            <pc:docMk/>
+            <pc:sldMk cId="4249282133" sldId="261"/>
+            <ac:spMk id="18" creationId="{8DF991D4-6276-89D7-3945-8E81BF187875}"/>
+          </ac:spMkLst>
+        </pc:spChg>
+        <pc:spChg chg="add mod">
+          <ac:chgData name="Or Forshmit" userId="7c842d5c4cf4431e" providerId="LiveId" clId="{3E18CC7B-CFC1-4E27-A1BD-24931C36162E}" dt="2026-02-01T08:38:37.233" v="714" actId="1076"/>
+          <ac:spMkLst>
+            <pc:docMk/>
+            <pc:sldMk cId="4249282133" sldId="261"/>
+            <ac:spMk id="23" creationId="{8E12DF7E-B187-FBE5-30E0-DB655534FBEE}"/>
+          </ac:spMkLst>
+        </pc:spChg>
+        <pc:spChg chg="add mod">
+          <ac:chgData name="Or Forshmit" userId="7c842d5c4cf4431e" providerId="LiveId" clId="{3E18CC7B-CFC1-4E27-A1BD-24931C36162E}" dt="2026-02-01T08:38:51.549" v="720" actId="1076"/>
+          <ac:spMkLst>
+            <pc:docMk/>
+            <pc:sldMk cId="4249282133" sldId="261"/>
+            <ac:spMk id="29" creationId="{3C9239DF-B83D-5DCF-6DBF-7DF6C2C374DB}"/>
+          </ac:spMkLst>
+        </pc:spChg>
+        <pc:spChg chg="add mod">
+          <ac:chgData name="Or Forshmit" userId="7c842d5c4cf4431e" providerId="LiveId" clId="{3E18CC7B-CFC1-4E27-A1BD-24931C36162E}" dt="2026-02-01T08:39:09.512" v="774" actId="20577"/>
+          <ac:spMkLst>
+            <pc:docMk/>
+            <pc:sldMk cId="4249282133" sldId="261"/>
+            <ac:spMk id="30" creationId="{C6FA9253-7898-4CF8-D144-7215B044B1BD}"/>
+          </ac:spMkLst>
+        </pc:spChg>
+        <pc:spChg chg="add mod">
+          <ac:chgData name="Or Forshmit" userId="7c842d5c4cf4431e" providerId="LiveId" clId="{3E18CC7B-CFC1-4E27-A1BD-24931C36162E}" dt="2026-02-01T08:39:31.945" v="781" actId="1076"/>
+          <ac:spMkLst>
+            <pc:docMk/>
+            <pc:sldMk cId="4249282133" sldId="261"/>
+            <ac:spMk id="33" creationId="{A6DB8C2B-09E7-BEEA-4C23-78A752B67DBB}"/>
+          </ac:spMkLst>
+        </pc:spChg>
+        <pc:cxnChg chg="del">
+          <ac:chgData name="Or Forshmit" userId="7c842d5c4cf4431e" providerId="LiveId" clId="{3E18CC7B-CFC1-4E27-A1BD-24931C36162E}" dt="2026-02-01T08:35:02.915" v="607" actId="478"/>
+          <ac:cxnSpMkLst>
+            <pc:docMk/>
+            <pc:sldMk cId="4249282133" sldId="261"/>
+            <ac:cxnSpMk id="6" creationId="{46B83CE0-4C86-D0BD-CB9C-9195B5BCA774}"/>
+          </ac:cxnSpMkLst>
+        </pc:cxnChg>
+        <pc:cxnChg chg="del">
+          <ac:chgData name="Or Forshmit" userId="7c842d5c4cf4431e" providerId="LiveId" clId="{3E18CC7B-CFC1-4E27-A1BD-24931C36162E}" dt="2026-02-01T08:35:02.915" v="607" actId="478"/>
+          <ac:cxnSpMkLst>
+            <pc:docMk/>
+            <pc:sldMk cId="4249282133" sldId="261"/>
+            <ac:cxnSpMk id="7" creationId="{C96BDF07-5DD2-08C1-BA46-0569430F7CBB}"/>
+          </ac:cxnSpMkLst>
+        </pc:cxnChg>
+        <pc:cxnChg chg="add mod">
+          <ac:chgData name="Or Forshmit" userId="7c842d5c4cf4431e" providerId="LiveId" clId="{3E18CC7B-CFC1-4E27-A1BD-24931C36162E}" dt="2026-02-01T08:37:30.690" v="693" actId="1076"/>
+          <ac:cxnSpMkLst>
+            <pc:docMk/>
+            <pc:sldMk cId="4249282133" sldId="261"/>
+            <ac:cxnSpMk id="14" creationId="{50FA29AF-A157-1973-A6F5-AE7EA3CEB96A}"/>
+          </ac:cxnSpMkLst>
+        </pc:cxnChg>
+        <pc:cxnChg chg="del mod">
+          <ac:chgData name="Or Forshmit" userId="7c842d5c4cf4431e" providerId="LiveId" clId="{3E18CC7B-CFC1-4E27-A1BD-24931C36162E}" dt="2026-02-01T08:35:02.915" v="607" actId="478"/>
+          <ac:cxnSpMkLst>
+            <pc:docMk/>
+            <pc:sldMk cId="4249282133" sldId="261"/>
+            <ac:cxnSpMk id="20" creationId="{0906EA06-9483-E49A-A952-416A5BC013CB}"/>
+          </ac:cxnSpMkLst>
+        </pc:cxnChg>
+        <pc:cxnChg chg="del">
+          <ac:chgData name="Or Forshmit" userId="7c842d5c4cf4431e" providerId="LiveId" clId="{3E18CC7B-CFC1-4E27-A1BD-24931C36162E}" dt="2026-02-01T08:35:02.915" v="607" actId="478"/>
+          <ac:cxnSpMkLst>
+            <pc:docMk/>
+            <pc:sldMk cId="4249282133" sldId="261"/>
+            <ac:cxnSpMk id="21" creationId="{FF69AC9D-7508-4093-FECB-25A981808719}"/>
+          </ac:cxnSpMkLst>
+        </pc:cxnChg>
+        <pc:cxnChg chg="add mod">
+          <ac:chgData name="Or Forshmit" userId="7c842d5c4cf4431e" providerId="LiveId" clId="{3E18CC7B-CFC1-4E27-A1BD-24931C36162E}" dt="2026-02-01T08:38:10.060" v="705" actId="208"/>
+          <ac:cxnSpMkLst>
+            <pc:docMk/>
+            <pc:sldMk cId="4249282133" sldId="261"/>
+            <ac:cxnSpMk id="22" creationId="{DA64482E-326B-B813-5F63-D484C440D891}"/>
+          </ac:cxnSpMkLst>
+        </pc:cxnChg>
+        <pc:cxnChg chg="del">
+          <ac:chgData name="Or Forshmit" userId="7c842d5c4cf4431e" providerId="LiveId" clId="{3E18CC7B-CFC1-4E27-A1BD-24931C36162E}" dt="2026-02-01T08:35:02.915" v="607" actId="478"/>
+          <ac:cxnSpMkLst>
+            <pc:docMk/>
+            <pc:sldMk cId="4249282133" sldId="261"/>
+            <ac:cxnSpMk id="24" creationId="{97A877FE-CAFF-8CA6-6D0C-9C6895F5AB4D}"/>
+          </ac:cxnSpMkLst>
+        </pc:cxnChg>
+        <pc:cxnChg chg="add mod">
+          <ac:chgData name="Or Forshmit" userId="7c842d5c4cf4431e" providerId="LiveId" clId="{3E18CC7B-CFC1-4E27-A1BD-24931C36162E}" dt="2026-02-01T08:38:24.676" v="709" actId="14100"/>
+          <ac:cxnSpMkLst>
+            <pc:docMk/>
+            <pc:sldMk cId="4249282133" sldId="261"/>
+            <ac:cxnSpMk id="25" creationId="{1DE5EB95-354B-58C8-AD5E-33328AF78807}"/>
+          </ac:cxnSpMkLst>
+        </pc:cxnChg>
+        <pc:cxnChg chg="del">
+          <ac:chgData name="Or Forshmit" userId="7c842d5c4cf4431e" providerId="LiveId" clId="{3E18CC7B-CFC1-4E27-A1BD-24931C36162E}" dt="2026-02-01T08:35:02.915" v="607" actId="478"/>
+          <ac:cxnSpMkLst>
+            <pc:docMk/>
+            <pc:sldMk cId="4249282133" sldId="261"/>
+            <ac:cxnSpMk id="27" creationId="{6450017D-9F2B-D372-0DEF-B6E46591C5C6}"/>
+          </ac:cxnSpMkLst>
+        </pc:cxnChg>
+        <pc:cxnChg chg="add mod">
+          <ac:chgData name="Or Forshmit" userId="7c842d5c4cf4431e" providerId="LiveId" clId="{3E18CC7B-CFC1-4E27-A1BD-24931C36162E}" dt="2026-02-01T08:39:29.198" v="780" actId="14100"/>
+          <ac:cxnSpMkLst>
+            <pc:docMk/>
+            <pc:sldMk cId="4249282133" sldId="261"/>
+            <ac:cxnSpMk id="32" creationId="{084FCE03-AD2C-8375-FF2B-1E57983A0D91}"/>
           </ac:cxnSpMkLst>
         </pc:cxnChg>
       </pc:sldChg>
@@ -1034,7 +1099,7 @@
           <a:p>
             <a:fld id="{45E6FCBF-32B6-47D0-9AE4-AC041F07E2DD}" type="datetimeFigureOut">
               <a:rPr lang="en-GB" smtClean="0"/>
-              <a:t>31/01/2026</a:t>
+              <a:t>01/02/2026</a:t>
             </a:fld>
             <a:endParaRPr lang="en-GB"/>
           </a:p>
@@ -1790,6 +1855,118 @@
 </p:notes>
 </file>
 
+<file path=ppt/notesSlides/notesSlide6.xml><?xml version="1.0" encoding="utf-8"?>
+<p:notes xmlns:a="http://schemas.openxmlformats.org/drawingml/2006/main" xmlns:r="http://schemas.openxmlformats.org/officeDocument/2006/relationships" xmlns:p="http://schemas.openxmlformats.org/presentationml/2006/main">
+  <p:cSld>
+    <p:spTree>
+      <p:nvGrpSpPr>
+        <p:cNvPr id="1" name="">
+          <a:extLst>
+            <a:ext uri="{FF2B5EF4-FFF2-40B4-BE49-F238E27FC236}">
+              <a16:creationId xmlns:a16="http://schemas.microsoft.com/office/drawing/2014/main" id="{30DBD3B6-10FD-E7FB-0B81-2F17CCC55766}"/>
+            </a:ext>
+          </a:extLst>
+        </p:cNvPr>
+        <p:cNvGrpSpPr/>
+        <p:nvPr/>
+      </p:nvGrpSpPr>
+      <p:grpSpPr>
+        <a:xfrm>
+          <a:off x="0" y="0"/>
+          <a:ext cx="0" cy="0"/>
+          <a:chOff x="0" y="0"/>
+          <a:chExt cx="0" cy="0"/>
+        </a:xfrm>
+      </p:grpSpPr>
+      <p:sp>
+        <p:nvSpPr>
+          <p:cNvPr id="2" name="Slide Image Placeholder 1">
+            <a:extLst>
+              <a:ext uri="{FF2B5EF4-FFF2-40B4-BE49-F238E27FC236}">
+                <a16:creationId xmlns:a16="http://schemas.microsoft.com/office/drawing/2014/main" id="{F378CFE1-6D22-20E4-F0CD-06CA47769981}"/>
+              </a:ext>
+            </a:extLst>
+          </p:cNvPr>
+          <p:cNvSpPr>
+            <a:spLocks noGrp="1" noRot="1" noChangeAspect="1"/>
+          </p:cNvSpPr>
+          <p:nvPr>
+            <p:ph type="sldImg"/>
+          </p:nvPr>
+        </p:nvSpPr>
+        <p:spPr/>
+      </p:sp>
+      <p:sp>
+        <p:nvSpPr>
+          <p:cNvPr id="3" name="Notes Placeholder 2">
+            <a:extLst>
+              <a:ext uri="{FF2B5EF4-FFF2-40B4-BE49-F238E27FC236}">
+                <a16:creationId xmlns:a16="http://schemas.microsoft.com/office/drawing/2014/main" id="{6B05C30C-E738-FD40-1D3F-EE136329D04A}"/>
+              </a:ext>
+            </a:extLst>
+          </p:cNvPr>
+          <p:cNvSpPr>
+            <a:spLocks noGrp="1"/>
+          </p:cNvSpPr>
+          <p:nvPr>
+            <p:ph type="body" idx="1"/>
+          </p:nvPr>
+        </p:nvSpPr>
+        <p:spPr/>
+        <p:txBody>
+          <a:bodyPr/>
+          <a:lstStyle/>
+          <a:p>
+            <a:r>
+              <a:rPr lang="he-IL" dirty="0"/>
+              <a:t>תרגול 7 – שקף 13 – 00:41</a:t>
+            </a:r>
+            <a:endParaRPr lang="en-IL" dirty="0"/>
+          </a:p>
+        </p:txBody>
+      </p:sp>
+      <p:sp>
+        <p:nvSpPr>
+          <p:cNvPr id="4" name="Slide Number Placeholder 3">
+            <a:extLst>
+              <a:ext uri="{FF2B5EF4-FFF2-40B4-BE49-F238E27FC236}">
+                <a16:creationId xmlns:a16="http://schemas.microsoft.com/office/drawing/2014/main" id="{2004B7D2-D8D6-4A24-4555-F82B413100C4}"/>
+              </a:ext>
+            </a:extLst>
+          </p:cNvPr>
+          <p:cNvSpPr>
+            <a:spLocks noGrp="1"/>
+          </p:cNvSpPr>
+          <p:nvPr>
+            <p:ph type="sldNum" sz="quarter" idx="5"/>
+          </p:nvPr>
+        </p:nvSpPr>
+        <p:spPr/>
+        <p:txBody>
+          <a:bodyPr/>
+          <a:lstStyle/>
+          <a:p>
+            <a:fld id="{DD82491D-C4AE-4DEA-AA61-27B830F6AD43}" type="slidenum">
+              <a:rPr lang="en-GB" smtClean="0"/>
+              <a:t>6</a:t>
+            </a:fld>
+            <a:endParaRPr lang="en-GB"/>
+          </a:p>
+        </p:txBody>
+      </p:sp>
+    </p:spTree>
+    <p:extLst>
+      <p:ext uri="{BB962C8B-B14F-4D97-AF65-F5344CB8AC3E}">
+        <p14:creationId xmlns:p14="http://schemas.microsoft.com/office/powerpoint/2010/main" val="2168389257"/>
+      </p:ext>
+    </p:extLst>
+  </p:cSld>
+  <p:clrMapOvr>
+    <a:masterClrMapping/>
+  </p:clrMapOvr>
+</p:notes>
+</file>
+
 <file path=ppt/slideLayouts/slideLayout1.xml><?xml version="1.0" encoding="utf-8"?>
 <p:sldLayout xmlns:a="http://schemas.openxmlformats.org/drawingml/2006/main" xmlns:r="http://schemas.openxmlformats.org/officeDocument/2006/relationships" xmlns:p="http://schemas.openxmlformats.org/presentationml/2006/main" type="title" preserve="1">
   <p:cSld name="Title Slide">
@@ -1939,7 +2116,7 @@
           <a:p>
             <a:fld id="{94F658A5-19D4-4454-889E-14DA804222B5}" type="datetimeFigureOut">
               <a:rPr lang="en-GB" smtClean="0"/>
-              <a:t>31/01/2026</a:t>
+              <a:t>01/02/2026</a:t>
             </a:fld>
             <a:endParaRPr lang="en-GB"/>
           </a:p>
@@ -2139,7 +2316,7 @@
           <a:p>
             <a:fld id="{94F658A5-19D4-4454-889E-14DA804222B5}" type="datetimeFigureOut">
               <a:rPr lang="en-GB" smtClean="0"/>
-              <a:t>31/01/2026</a:t>
+              <a:t>01/02/2026</a:t>
             </a:fld>
             <a:endParaRPr lang="en-GB"/>
           </a:p>
@@ -2349,7 +2526,7 @@
           <a:p>
             <a:fld id="{94F658A5-19D4-4454-889E-14DA804222B5}" type="datetimeFigureOut">
               <a:rPr lang="en-GB" smtClean="0"/>
-              <a:t>31/01/2026</a:t>
+              <a:t>01/02/2026</a:t>
             </a:fld>
             <a:endParaRPr lang="en-GB"/>
           </a:p>
@@ -2549,7 +2726,7 @@
           <a:p>
             <a:fld id="{94F658A5-19D4-4454-889E-14DA804222B5}" type="datetimeFigureOut">
               <a:rPr lang="en-GB" smtClean="0"/>
-              <a:t>31/01/2026</a:t>
+              <a:t>01/02/2026</a:t>
             </a:fld>
             <a:endParaRPr lang="en-GB"/>
           </a:p>
@@ -2825,7 +3002,7 @@
           <a:p>
             <a:fld id="{94F658A5-19D4-4454-889E-14DA804222B5}" type="datetimeFigureOut">
               <a:rPr lang="en-GB" smtClean="0"/>
-              <a:t>31/01/2026</a:t>
+              <a:t>01/02/2026</a:t>
             </a:fld>
             <a:endParaRPr lang="en-GB"/>
           </a:p>
@@ -3093,7 +3270,7 @@
           <a:p>
             <a:fld id="{94F658A5-19D4-4454-889E-14DA804222B5}" type="datetimeFigureOut">
               <a:rPr lang="en-GB" smtClean="0"/>
-              <a:t>31/01/2026</a:t>
+              <a:t>01/02/2026</a:t>
             </a:fld>
             <a:endParaRPr lang="en-GB"/>
           </a:p>
@@ -3508,7 +3685,7 @@
           <a:p>
             <a:fld id="{94F658A5-19D4-4454-889E-14DA804222B5}" type="datetimeFigureOut">
               <a:rPr lang="en-GB" smtClean="0"/>
-              <a:t>31/01/2026</a:t>
+              <a:t>01/02/2026</a:t>
             </a:fld>
             <a:endParaRPr lang="en-GB"/>
           </a:p>
@@ -3650,7 +3827,7 @@
           <a:p>
             <a:fld id="{94F658A5-19D4-4454-889E-14DA804222B5}" type="datetimeFigureOut">
               <a:rPr lang="en-GB" smtClean="0"/>
-              <a:t>31/01/2026</a:t>
+              <a:t>01/02/2026</a:t>
             </a:fld>
             <a:endParaRPr lang="en-GB"/>
           </a:p>
@@ -3763,7 +3940,7 @@
           <a:p>
             <a:fld id="{94F658A5-19D4-4454-889E-14DA804222B5}" type="datetimeFigureOut">
               <a:rPr lang="en-GB" smtClean="0"/>
-              <a:t>31/01/2026</a:t>
+              <a:t>01/02/2026</a:t>
             </a:fld>
             <a:endParaRPr lang="en-GB"/>
           </a:p>
@@ -4076,7 +4253,7 @@
           <a:p>
             <a:fld id="{94F658A5-19D4-4454-889E-14DA804222B5}" type="datetimeFigureOut">
               <a:rPr lang="en-GB" smtClean="0"/>
-              <a:t>31/01/2026</a:t>
+              <a:t>01/02/2026</a:t>
             </a:fld>
             <a:endParaRPr lang="en-GB"/>
           </a:p>
@@ -4365,7 +4542,7 @@
           <a:p>
             <a:fld id="{94F658A5-19D4-4454-889E-14DA804222B5}" type="datetimeFigureOut">
               <a:rPr lang="en-GB" smtClean="0"/>
-              <a:t>31/01/2026</a:t>
+              <a:t>01/02/2026</a:t>
             </a:fld>
             <a:endParaRPr lang="en-GB"/>
           </a:p>
@@ -4608,7 +4785,7 @@
           <a:p>
             <a:fld id="{94F658A5-19D4-4454-889E-14DA804222B5}" type="datetimeFigureOut">
               <a:rPr lang="en-GB" smtClean="0"/>
-              <a:t>31/01/2026</a:t>
+              <a:t>01/02/2026</a:t>
             </a:fld>
             <a:endParaRPr lang="en-GB"/>
           </a:p>
@@ -8047,6 +8224,837 @@
     <p:extLst>
       <p:ext uri="{BB962C8B-B14F-4D97-AF65-F5344CB8AC3E}">
         <p14:creationId xmlns:p14="http://schemas.microsoft.com/office/powerpoint/2010/main" val="1068988793"/>
+      </p:ext>
+    </p:extLst>
+  </p:cSld>
+  <p:clrMapOvr>
+    <a:masterClrMapping/>
+  </p:clrMapOvr>
+</p:sld>
+</file>
+
+<file path=ppt/slides/slide6.xml><?xml version="1.0" encoding="utf-8"?>
+<p:sld xmlns:a="http://schemas.openxmlformats.org/drawingml/2006/main" xmlns:r="http://schemas.openxmlformats.org/officeDocument/2006/relationships" xmlns:p="http://schemas.openxmlformats.org/presentationml/2006/main">
+  <p:cSld>
+    <p:spTree>
+      <p:nvGrpSpPr>
+        <p:cNvPr id="1" name="">
+          <a:extLst>
+            <a:ext uri="{FF2B5EF4-FFF2-40B4-BE49-F238E27FC236}">
+              <a16:creationId xmlns:a16="http://schemas.microsoft.com/office/drawing/2014/main" id="{DB78043F-3613-D5C5-9457-1111BB69DED5}"/>
+            </a:ext>
+          </a:extLst>
+        </p:cNvPr>
+        <p:cNvGrpSpPr/>
+        <p:nvPr/>
+      </p:nvGrpSpPr>
+      <p:grpSpPr>
+        <a:xfrm>
+          <a:off x="0" y="0"/>
+          <a:ext cx="0" cy="0"/>
+          <a:chOff x="0" y="0"/>
+          <a:chExt cx="0" cy="0"/>
+        </a:xfrm>
+      </p:grpSpPr>
+      <p:sp>
+        <p:nvSpPr>
+          <p:cNvPr id="3" name="Oval 2">
+            <a:extLst>
+              <a:ext uri="{FF2B5EF4-FFF2-40B4-BE49-F238E27FC236}">
+                <a16:creationId xmlns:a16="http://schemas.microsoft.com/office/drawing/2014/main" id="{052DFC8D-32F6-A5C1-A454-C8B6860161DF}"/>
+              </a:ext>
+            </a:extLst>
+          </p:cNvPr>
+          <p:cNvSpPr/>
+          <p:nvPr/>
+        </p:nvSpPr>
+        <p:spPr>
+          <a:xfrm>
+            <a:off x="1132114" y="1121228"/>
+            <a:ext cx="979714" cy="957944"/>
+          </a:xfrm>
+          <a:prstGeom prst="ellipse">
+            <a:avLst/>
+          </a:prstGeom>
+          <a:noFill/>
+          <a:ln>
+            <a:solidFill>
+              <a:schemeClr val="tx1"/>
+            </a:solidFill>
+          </a:ln>
+        </p:spPr>
+        <p:style>
+          <a:lnRef idx="2">
+            <a:schemeClr val="accent1">
+              <a:shade val="15000"/>
+            </a:schemeClr>
+          </a:lnRef>
+          <a:fillRef idx="1">
+            <a:schemeClr val="accent1"/>
+          </a:fillRef>
+          <a:effectRef idx="0">
+            <a:schemeClr val="accent1"/>
+          </a:effectRef>
+          <a:fontRef idx="minor">
+            <a:schemeClr val="lt1"/>
+          </a:fontRef>
+        </p:style>
+        <p:txBody>
+          <a:bodyPr rtlCol="0" anchor="ctr"/>
+          <a:lstStyle/>
+          <a:p>
+            <a:pPr algn="ctr"/>
+            <a:endParaRPr lang="en-GB"/>
+          </a:p>
+        </p:txBody>
+      </p:sp>
+      <mc:AlternateContent xmlns:mc="http://schemas.openxmlformats.org/markup-compatibility/2006">
+        <mc:Choice xmlns:a14="http://schemas.microsoft.com/office/drawing/2010/main" Requires="a14">
+          <p:sp>
+            <p:nvSpPr>
+              <p:cNvPr id="4" name="TextBox 3">
+                <a:extLst>
+                  <a:ext uri="{FF2B5EF4-FFF2-40B4-BE49-F238E27FC236}">
+                    <a16:creationId xmlns:a16="http://schemas.microsoft.com/office/drawing/2014/main" id="{3154E2B7-F23E-C180-30D3-70869CB77FFB}"/>
+                  </a:ext>
+                </a:extLst>
+              </p:cNvPr>
+              <p:cNvSpPr txBox="1"/>
+              <p:nvPr/>
+            </p:nvSpPr>
+            <p:spPr>
+              <a:xfrm>
+                <a:off x="1230085" y="1121228"/>
+                <a:ext cx="783771" cy="769441"/>
+              </a:xfrm>
+              <a:prstGeom prst="rect">
+                <a:avLst/>
+              </a:prstGeom>
+              <a:noFill/>
+            </p:spPr>
+            <p:txBody>
+              <a:bodyPr wrap="square" rtlCol="0">
+                <a:spAutoFit/>
+              </a:bodyPr>
+              <a:lstStyle/>
+              <a:p>
+                <a14:m>
+                  <m:oMathPara xmlns:m="http://schemas.openxmlformats.org/officeDocument/2006/math">
+                    <m:oMathParaPr>
+                      <m:jc m:val="centerGroup"/>
+                    </m:oMathParaPr>
+                    <m:oMath xmlns:m="http://schemas.openxmlformats.org/officeDocument/2006/math">
+                      <m:r>
+                        <a:rPr lang="en-GB" sz="4400" b="0" i="1" smtClean="0">
+                          <a:latin typeface="Cambria Math" panose="02040503050406030204" pitchFamily="18" charset="0"/>
+                        </a:rPr>
+                        <m:t>𝑥</m:t>
+                      </m:r>
+                    </m:oMath>
+                  </m:oMathPara>
+                </a14:m>
+                <a:endParaRPr lang="en-GB" sz="4400" dirty="0"/>
+              </a:p>
+            </p:txBody>
+          </p:sp>
+        </mc:Choice>
+        <mc:Fallback>
+          <p:sp>
+            <p:nvSpPr>
+              <p:cNvPr id="4" name="TextBox 3">
+                <a:extLst>
+                  <a:ext uri="{FF2B5EF4-FFF2-40B4-BE49-F238E27FC236}">
+                    <a16:creationId xmlns:a16="http://schemas.microsoft.com/office/drawing/2014/main" id="{3154E2B7-F23E-C180-30D3-70869CB77FFB}"/>
+                  </a:ext>
+                </a:extLst>
+              </p:cNvPr>
+              <p:cNvSpPr txBox="1">
+                <a:spLocks noRot="1" noChangeAspect="1" noMove="1" noResize="1" noEditPoints="1" noAdjustHandles="1" noChangeArrowheads="1" noChangeShapeType="1" noTextEdit="1"/>
+              </p:cNvSpPr>
+              <p:nvPr/>
+            </p:nvSpPr>
+            <p:spPr>
+              <a:xfrm>
+                <a:off x="1230085" y="1121228"/>
+                <a:ext cx="783771" cy="769441"/>
+              </a:xfrm>
+              <a:prstGeom prst="rect">
+                <a:avLst/>
+              </a:prstGeom>
+              <a:blipFill>
+                <a:blip r:embed="rId3"/>
+                <a:stretch>
+                  <a:fillRect/>
+                </a:stretch>
+              </a:blipFill>
+            </p:spPr>
+            <p:txBody>
+              <a:bodyPr/>
+              <a:lstStyle/>
+              <a:p>
+                <a:r>
+                  <a:rPr lang="en-GB">
+                    <a:noFill/>
+                  </a:rPr>
+                  <a:t> </a:t>
+                </a:r>
+              </a:p>
+            </p:txBody>
+          </p:sp>
+        </mc:Fallback>
+      </mc:AlternateContent>
+      <p:sp>
+        <p:nvSpPr>
+          <p:cNvPr id="5" name="Oval 4">
+            <a:extLst>
+              <a:ext uri="{FF2B5EF4-FFF2-40B4-BE49-F238E27FC236}">
+                <a16:creationId xmlns:a16="http://schemas.microsoft.com/office/drawing/2014/main" id="{EC822FD2-F493-8A34-F8AF-F0FF9D7F09F4}"/>
+              </a:ext>
+            </a:extLst>
+          </p:cNvPr>
+          <p:cNvSpPr/>
+          <p:nvPr/>
+        </p:nvSpPr>
+        <p:spPr>
+          <a:xfrm>
+            <a:off x="1132114" y="2841171"/>
+            <a:ext cx="979714" cy="957944"/>
+          </a:xfrm>
+          <a:prstGeom prst="ellipse">
+            <a:avLst/>
+          </a:prstGeom>
+          <a:noFill/>
+          <a:ln>
+            <a:solidFill>
+              <a:schemeClr val="tx1"/>
+            </a:solidFill>
+          </a:ln>
+        </p:spPr>
+        <p:style>
+          <a:lnRef idx="2">
+            <a:schemeClr val="accent1">
+              <a:shade val="15000"/>
+            </a:schemeClr>
+          </a:lnRef>
+          <a:fillRef idx="1">
+            <a:schemeClr val="accent1"/>
+          </a:fillRef>
+          <a:effectRef idx="0">
+            <a:schemeClr val="accent1"/>
+          </a:effectRef>
+          <a:fontRef idx="minor">
+            <a:schemeClr val="lt1"/>
+          </a:fontRef>
+        </p:style>
+        <p:txBody>
+          <a:bodyPr rtlCol="0" anchor="ctr"/>
+          <a:lstStyle/>
+          <a:p>
+            <a:pPr algn="ctr"/>
+            <a:endParaRPr lang="en-GB"/>
+          </a:p>
+        </p:txBody>
+      </p:sp>
+      <mc:AlternateContent xmlns:mc="http://schemas.openxmlformats.org/markup-compatibility/2006">
+        <mc:Choice xmlns:a14="http://schemas.microsoft.com/office/drawing/2010/main" Requires="a14">
+          <p:sp>
+            <p:nvSpPr>
+              <p:cNvPr id="8" name="TextBox 7">
+                <a:extLst>
+                  <a:ext uri="{FF2B5EF4-FFF2-40B4-BE49-F238E27FC236}">
+                    <a16:creationId xmlns:a16="http://schemas.microsoft.com/office/drawing/2014/main" id="{352C131C-22DA-F665-9F95-91F76FAD1C45}"/>
+                  </a:ext>
+                </a:extLst>
+              </p:cNvPr>
+              <p:cNvSpPr txBox="1"/>
+              <p:nvPr/>
+            </p:nvSpPr>
+            <p:spPr>
+              <a:xfrm>
+                <a:off x="1230085" y="2841171"/>
+                <a:ext cx="783771" cy="769441"/>
+              </a:xfrm>
+              <a:prstGeom prst="rect">
+                <a:avLst/>
+              </a:prstGeom>
+              <a:noFill/>
+            </p:spPr>
+            <p:txBody>
+              <a:bodyPr wrap="square" rtlCol="0">
+                <a:spAutoFit/>
+              </a:bodyPr>
+              <a:lstStyle/>
+              <a:p>
+                <a14:m>
+                  <m:oMathPara xmlns:m="http://schemas.openxmlformats.org/officeDocument/2006/math">
+                    <m:oMathParaPr>
+                      <m:jc m:val="centerGroup"/>
+                    </m:oMathParaPr>
+                    <m:oMath xmlns:m="http://schemas.openxmlformats.org/officeDocument/2006/math">
+                      <m:r>
+                        <a:rPr lang="en-GB" sz="4400" b="0" i="1" smtClean="0">
+                          <a:latin typeface="Cambria Math" panose="02040503050406030204" pitchFamily="18" charset="0"/>
+                        </a:rPr>
+                        <m:t>𝑥</m:t>
+                      </m:r>
+                    </m:oMath>
+                  </m:oMathPara>
+                </a14:m>
+                <a:endParaRPr lang="en-GB" sz="4400" dirty="0"/>
+              </a:p>
+            </p:txBody>
+          </p:sp>
+        </mc:Choice>
+        <mc:Fallback>
+          <p:sp>
+            <p:nvSpPr>
+              <p:cNvPr id="8" name="TextBox 7">
+                <a:extLst>
+                  <a:ext uri="{FF2B5EF4-FFF2-40B4-BE49-F238E27FC236}">
+                    <a16:creationId xmlns:a16="http://schemas.microsoft.com/office/drawing/2014/main" id="{352C131C-22DA-F665-9F95-91F76FAD1C45}"/>
+                  </a:ext>
+                </a:extLst>
+              </p:cNvPr>
+              <p:cNvSpPr txBox="1">
+                <a:spLocks noRot="1" noChangeAspect="1" noMove="1" noResize="1" noEditPoints="1" noAdjustHandles="1" noChangeArrowheads="1" noChangeShapeType="1" noTextEdit="1"/>
+              </p:cNvSpPr>
+              <p:nvPr/>
+            </p:nvSpPr>
+            <p:spPr>
+              <a:xfrm>
+                <a:off x="1230085" y="2841171"/>
+                <a:ext cx="783771" cy="769441"/>
+              </a:xfrm>
+              <a:prstGeom prst="rect">
+                <a:avLst/>
+              </a:prstGeom>
+              <a:blipFill>
+                <a:blip r:embed="rId4"/>
+                <a:stretch>
+                  <a:fillRect/>
+                </a:stretch>
+              </a:blipFill>
+            </p:spPr>
+            <p:txBody>
+              <a:bodyPr/>
+              <a:lstStyle/>
+              <a:p>
+                <a:r>
+                  <a:rPr lang="en-GB">
+                    <a:noFill/>
+                  </a:rPr>
+                  <a:t> </a:t>
+                </a:r>
+              </a:p>
+            </p:txBody>
+          </p:sp>
+        </mc:Fallback>
+      </mc:AlternateContent>
+      <p:sp>
+        <p:nvSpPr>
+          <p:cNvPr id="9" name="Oval 8">
+            <a:extLst>
+              <a:ext uri="{FF2B5EF4-FFF2-40B4-BE49-F238E27FC236}">
+                <a16:creationId xmlns:a16="http://schemas.microsoft.com/office/drawing/2014/main" id="{E3426335-B74B-87DD-88FC-0A1FBEA774FD}"/>
+              </a:ext>
+            </a:extLst>
+          </p:cNvPr>
+          <p:cNvSpPr/>
+          <p:nvPr/>
+        </p:nvSpPr>
+        <p:spPr>
+          <a:xfrm>
+            <a:off x="3385456" y="1981200"/>
+            <a:ext cx="979714" cy="957944"/>
+          </a:xfrm>
+          <a:prstGeom prst="ellipse">
+            <a:avLst/>
+          </a:prstGeom>
+          <a:noFill/>
+          <a:ln>
+            <a:solidFill>
+              <a:schemeClr val="tx1"/>
+            </a:solidFill>
+          </a:ln>
+        </p:spPr>
+        <p:style>
+          <a:lnRef idx="2">
+            <a:schemeClr val="accent1">
+              <a:shade val="15000"/>
+            </a:schemeClr>
+          </a:lnRef>
+          <a:fillRef idx="1">
+            <a:schemeClr val="accent1"/>
+          </a:fillRef>
+          <a:effectRef idx="0">
+            <a:schemeClr val="accent1"/>
+          </a:effectRef>
+          <a:fontRef idx="minor">
+            <a:schemeClr val="lt1"/>
+          </a:fontRef>
+        </p:style>
+        <p:txBody>
+          <a:bodyPr rtlCol="0" anchor="ctr"/>
+          <a:lstStyle/>
+          <a:p>
+            <a:pPr algn="ctr"/>
+            <a:endParaRPr lang="en-GB"/>
+          </a:p>
+        </p:txBody>
+      </p:sp>
+      <p:cxnSp>
+        <p:nvCxnSpPr>
+          <p:cNvPr id="14" name="Straight Connector 13">
+            <a:extLst>
+              <a:ext uri="{FF2B5EF4-FFF2-40B4-BE49-F238E27FC236}">
+                <a16:creationId xmlns:a16="http://schemas.microsoft.com/office/drawing/2014/main" id="{50FA29AF-A157-1973-A6F5-AE7EA3CEB96A}"/>
+              </a:ext>
+            </a:extLst>
+          </p:cNvPr>
+          <p:cNvCxnSpPr>
+            <a:cxnSpLocks/>
+            <a:stCxn id="5" idx="4"/>
+            <a:endCxn id="15" idx="0"/>
+          </p:cNvCxnSpPr>
+          <p:nvPr/>
+        </p:nvCxnSpPr>
+        <p:spPr>
+          <a:xfrm flipH="1">
+            <a:off x="1230085" y="3799115"/>
+            <a:ext cx="391886" cy="342663"/>
+          </a:xfrm>
+          <a:prstGeom prst="line">
+            <a:avLst/>
+          </a:prstGeom>
+          <a:ln>
+            <a:solidFill>
+              <a:schemeClr val="tx1"/>
+            </a:solidFill>
+          </a:ln>
+        </p:spPr>
+        <p:style>
+          <a:lnRef idx="2">
+            <a:schemeClr val="accent1"/>
+          </a:lnRef>
+          <a:fillRef idx="0">
+            <a:schemeClr val="accent1"/>
+          </a:fillRef>
+          <a:effectRef idx="1">
+            <a:schemeClr val="accent1"/>
+          </a:effectRef>
+          <a:fontRef idx="minor">
+            <a:schemeClr val="tx1"/>
+          </a:fontRef>
+        </p:style>
+      </p:cxnSp>
+      <mc:AlternateContent xmlns:mc="http://schemas.openxmlformats.org/markup-compatibility/2006">
+        <mc:Choice xmlns:a14="http://schemas.microsoft.com/office/drawing/2010/main" Requires="a14">
+          <p:sp>
+            <p:nvSpPr>
+              <p:cNvPr id="15" name="TextBox 14">
+                <a:extLst>
+                  <a:ext uri="{FF2B5EF4-FFF2-40B4-BE49-F238E27FC236}">
+                    <a16:creationId xmlns:a16="http://schemas.microsoft.com/office/drawing/2014/main" id="{E205881D-DE3B-51AD-746A-6E578C0F95C0}"/>
+                  </a:ext>
+                </a:extLst>
+              </p:cNvPr>
+              <p:cNvSpPr txBox="1"/>
+              <p:nvPr/>
+            </p:nvSpPr>
+            <p:spPr>
+              <a:xfrm>
+                <a:off x="642256" y="4141778"/>
+                <a:ext cx="1175657" cy="461665"/>
+              </a:xfrm>
+              <a:prstGeom prst="rect">
+                <a:avLst/>
+              </a:prstGeom>
+              <a:noFill/>
+            </p:spPr>
+            <p:txBody>
+              <a:bodyPr wrap="square" rtlCol="0">
+                <a:spAutoFit/>
+              </a:bodyPr>
+              <a:lstStyle/>
+              <a:p>
+                <a14:m>
+                  <m:oMathPara xmlns:m="http://schemas.openxmlformats.org/officeDocument/2006/math">
+                    <m:oMathParaPr>
+                      <m:jc m:val="centerGroup"/>
+                    </m:oMathParaPr>
+                    <m:oMath xmlns:m="http://schemas.openxmlformats.org/officeDocument/2006/math">
+                      <m:r>
+                        <a:rPr lang="en-GB" sz="2400" b="0" i="1" smtClean="0">
+                          <a:latin typeface="Cambria Math" panose="02040503050406030204" pitchFamily="18" charset="0"/>
+                        </a:rPr>
+                        <m:t>0.5</m:t>
+                      </m:r>
+                    </m:oMath>
+                  </m:oMathPara>
+                </a14:m>
+                <a:endParaRPr lang="en-GB" sz="2400" dirty="0"/>
+              </a:p>
+            </p:txBody>
+          </p:sp>
+        </mc:Choice>
+        <mc:Fallback>
+          <p:sp>
+            <p:nvSpPr>
+              <p:cNvPr id="15" name="TextBox 14">
+                <a:extLst>
+                  <a:ext uri="{FF2B5EF4-FFF2-40B4-BE49-F238E27FC236}">
+                    <a16:creationId xmlns:a16="http://schemas.microsoft.com/office/drawing/2014/main" id="{E205881D-DE3B-51AD-746A-6E578C0F95C0}"/>
+                  </a:ext>
+                </a:extLst>
+              </p:cNvPr>
+              <p:cNvSpPr txBox="1">
+                <a:spLocks noRot="1" noChangeAspect="1" noMove="1" noResize="1" noEditPoints="1" noAdjustHandles="1" noChangeArrowheads="1" noChangeShapeType="1" noTextEdit="1"/>
+              </p:cNvSpPr>
+              <p:nvPr/>
+            </p:nvSpPr>
+            <p:spPr>
+              <a:xfrm>
+                <a:off x="642256" y="4141778"/>
+                <a:ext cx="1175657" cy="461665"/>
+              </a:xfrm>
+              <a:prstGeom prst="rect">
+                <a:avLst/>
+              </a:prstGeom>
+              <a:blipFill>
+                <a:blip r:embed="rId5"/>
+                <a:stretch>
+                  <a:fillRect/>
+                </a:stretch>
+              </a:blipFill>
+            </p:spPr>
+            <p:txBody>
+              <a:bodyPr/>
+              <a:lstStyle/>
+              <a:p>
+                <a:r>
+                  <a:rPr lang="en-GB">
+                    <a:noFill/>
+                  </a:rPr>
+                  <a:t> </a:t>
+                </a:r>
+              </a:p>
+            </p:txBody>
+          </p:sp>
+        </mc:Fallback>
+      </mc:AlternateContent>
+      <p:sp>
+        <p:nvSpPr>
+          <p:cNvPr id="18" name="TextBox 17">
+            <a:extLst>
+              <a:ext uri="{FF2B5EF4-FFF2-40B4-BE49-F238E27FC236}">
+                <a16:creationId xmlns:a16="http://schemas.microsoft.com/office/drawing/2014/main" id="{8DF991D4-6276-89D7-3945-8E81BF187875}"/>
+              </a:ext>
+            </a:extLst>
+          </p:cNvPr>
+          <p:cNvSpPr txBox="1"/>
+          <p:nvPr/>
+        </p:nvSpPr>
+        <p:spPr>
+          <a:xfrm>
+            <a:off x="2040089" y="3252166"/>
+            <a:ext cx="783771" cy="369332"/>
+          </a:xfrm>
+          <a:prstGeom prst="rect">
+            <a:avLst/>
+          </a:prstGeom>
+          <a:noFill/>
+        </p:spPr>
+        <p:txBody>
+          <a:bodyPr wrap="square" rtlCol="0">
+            <a:spAutoFit/>
+          </a:bodyPr>
+          <a:lstStyle/>
+          <a:p>
+            <a:r>
+              <a:rPr lang="en-GB" dirty="0"/>
+              <a:t>ReLU</a:t>
+            </a:r>
+          </a:p>
+        </p:txBody>
+      </p:sp>
+      <p:cxnSp>
+        <p:nvCxnSpPr>
+          <p:cNvPr id="22" name="Straight Connector 21">
+            <a:extLst>
+              <a:ext uri="{FF2B5EF4-FFF2-40B4-BE49-F238E27FC236}">
+                <a16:creationId xmlns:a16="http://schemas.microsoft.com/office/drawing/2014/main" id="{DA64482E-326B-B813-5F63-D484C440D891}"/>
+              </a:ext>
+            </a:extLst>
+          </p:cNvPr>
+          <p:cNvCxnSpPr>
+            <a:stCxn id="5" idx="6"/>
+            <a:endCxn id="9" idx="3"/>
+          </p:cNvCxnSpPr>
+          <p:nvPr/>
+        </p:nvCxnSpPr>
+        <p:spPr>
+          <a:xfrm flipV="1">
+            <a:off x="2111828" y="2798856"/>
+            <a:ext cx="1417104" cy="521287"/>
+          </a:xfrm>
+          <a:prstGeom prst="line">
+            <a:avLst/>
+          </a:prstGeom>
+          <a:ln>
+            <a:solidFill>
+              <a:schemeClr val="tx1"/>
+            </a:solidFill>
+          </a:ln>
+        </p:spPr>
+        <p:style>
+          <a:lnRef idx="2">
+            <a:schemeClr val="accent1"/>
+          </a:lnRef>
+          <a:fillRef idx="0">
+            <a:schemeClr val="accent1"/>
+          </a:fillRef>
+          <a:effectRef idx="1">
+            <a:schemeClr val="accent1"/>
+          </a:effectRef>
+          <a:fontRef idx="minor">
+            <a:schemeClr val="tx1"/>
+          </a:fontRef>
+        </p:style>
+      </p:cxnSp>
+      <p:sp>
+        <p:nvSpPr>
+          <p:cNvPr id="23" name="TextBox 22">
+            <a:extLst>
+              <a:ext uri="{FF2B5EF4-FFF2-40B4-BE49-F238E27FC236}">
+                <a16:creationId xmlns:a16="http://schemas.microsoft.com/office/drawing/2014/main" id="{8E12DF7E-B187-FBE5-30E0-DB655534FBEE}"/>
+              </a:ext>
+            </a:extLst>
+          </p:cNvPr>
+          <p:cNvSpPr txBox="1"/>
+          <p:nvPr/>
+        </p:nvSpPr>
+        <p:spPr>
+          <a:xfrm>
+            <a:off x="1964870" y="1741276"/>
+            <a:ext cx="783771" cy="369332"/>
+          </a:xfrm>
+          <a:prstGeom prst="rect">
+            <a:avLst/>
+          </a:prstGeom>
+          <a:noFill/>
+        </p:spPr>
+        <p:txBody>
+          <a:bodyPr wrap="square" rtlCol="0">
+            <a:spAutoFit/>
+          </a:bodyPr>
+          <a:lstStyle/>
+          <a:p>
+            <a:r>
+              <a:rPr lang="en-GB" dirty="0"/>
+              <a:t>ReLU</a:t>
+            </a:r>
+          </a:p>
+        </p:txBody>
+      </p:sp>
+      <p:cxnSp>
+        <p:nvCxnSpPr>
+          <p:cNvPr id="25" name="Straight Connector 24">
+            <a:extLst>
+              <a:ext uri="{FF2B5EF4-FFF2-40B4-BE49-F238E27FC236}">
+                <a16:creationId xmlns:a16="http://schemas.microsoft.com/office/drawing/2014/main" id="{1DE5EB95-354B-58C8-AD5E-33328AF78807}"/>
+              </a:ext>
+            </a:extLst>
+          </p:cNvPr>
+          <p:cNvCxnSpPr>
+            <a:cxnSpLocks/>
+            <a:stCxn id="3" idx="6"/>
+            <a:endCxn id="9" idx="1"/>
+          </p:cNvCxnSpPr>
+          <p:nvPr/>
+        </p:nvCxnSpPr>
+        <p:spPr>
+          <a:xfrm>
+            <a:off x="2111828" y="1600200"/>
+            <a:ext cx="1417104" cy="521288"/>
+          </a:xfrm>
+          <a:prstGeom prst="line">
+            <a:avLst/>
+          </a:prstGeom>
+          <a:ln>
+            <a:solidFill>
+              <a:schemeClr val="tx1"/>
+            </a:solidFill>
+          </a:ln>
+        </p:spPr>
+        <p:style>
+          <a:lnRef idx="2">
+            <a:schemeClr val="accent1"/>
+          </a:lnRef>
+          <a:fillRef idx="0">
+            <a:schemeClr val="accent1"/>
+          </a:fillRef>
+          <a:effectRef idx="1">
+            <a:schemeClr val="accent1"/>
+          </a:effectRef>
+          <a:fontRef idx="minor">
+            <a:schemeClr val="tx1"/>
+          </a:fontRef>
+        </p:style>
+      </p:cxnSp>
+      <p:sp>
+        <p:nvSpPr>
+          <p:cNvPr id="29" name="TextBox 28">
+            <a:extLst>
+              <a:ext uri="{FF2B5EF4-FFF2-40B4-BE49-F238E27FC236}">
+                <a16:creationId xmlns:a16="http://schemas.microsoft.com/office/drawing/2014/main" id="{3C9239DF-B83D-5DCF-6DBF-7DF6C2C374DB}"/>
+              </a:ext>
+            </a:extLst>
+          </p:cNvPr>
+          <p:cNvSpPr txBox="1"/>
+          <p:nvPr/>
+        </p:nvSpPr>
+        <p:spPr>
+          <a:xfrm>
+            <a:off x="2675163" y="1399179"/>
+            <a:ext cx="783771" cy="461665"/>
+          </a:xfrm>
+          <a:prstGeom prst="rect">
+            <a:avLst/>
+          </a:prstGeom>
+          <a:noFill/>
+        </p:spPr>
+        <p:txBody>
+          <a:bodyPr wrap="square" rtlCol="0">
+            <a:spAutoFit/>
+          </a:bodyPr>
+          <a:lstStyle/>
+          <a:p>
+            <a:r>
+              <a:rPr lang="en-GB" sz="2400" dirty="0"/>
+              <a:t>2</a:t>
+            </a:r>
+          </a:p>
+        </p:txBody>
+      </p:sp>
+      <p:sp>
+        <p:nvSpPr>
+          <p:cNvPr id="30" name="TextBox 29">
+            <a:extLst>
+              <a:ext uri="{FF2B5EF4-FFF2-40B4-BE49-F238E27FC236}">
+                <a16:creationId xmlns:a16="http://schemas.microsoft.com/office/drawing/2014/main" id="{C6FA9253-7898-4CF8-D144-7215B044B1BD}"/>
+              </a:ext>
+            </a:extLst>
+          </p:cNvPr>
+          <p:cNvSpPr txBox="1"/>
+          <p:nvPr/>
+        </p:nvSpPr>
+        <p:spPr>
+          <a:xfrm>
+            <a:off x="2675163" y="2618243"/>
+            <a:ext cx="783771" cy="461665"/>
+          </a:xfrm>
+          <a:prstGeom prst="rect">
+            <a:avLst/>
+          </a:prstGeom>
+          <a:noFill/>
+        </p:spPr>
+        <p:txBody>
+          <a:bodyPr wrap="square" rtlCol="0">
+            <a:spAutoFit/>
+          </a:bodyPr>
+          <a:lstStyle/>
+          <a:p>
+            <a:r>
+              <a:rPr lang="en-GB" sz="2400" dirty="0"/>
+              <a:t>-4</a:t>
+            </a:r>
+          </a:p>
+        </p:txBody>
+      </p:sp>
+      <p:cxnSp>
+        <p:nvCxnSpPr>
+          <p:cNvPr id="32" name="Straight Arrow Connector 31">
+            <a:extLst>
+              <a:ext uri="{FF2B5EF4-FFF2-40B4-BE49-F238E27FC236}">
+                <a16:creationId xmlns:a16="http://schemas.microsoft.com/office/drawing/2014/main" id="{084FCE03-AD2C-8375-FF2B-1E57983A0D91}"/>
+              </a:ext>
+            </a:extLst>
+          </p:cNvPr>
+          <p:cNvCxnSpPr>
+            <a:cxnSpLocks/>
+            <a:stCxn id="9" idx="6"/>
+          </p:cNvCxnSpPr>
+          <p:nvPr/>
+        </p:nvCxnSpPr>
+        <p:spPr>
+          <a:xfrm>
+            <a:off x="4365170" y="2460172"/>
+            <a:ext cx="723140" cy="0"/>
+          </a:xfrm>
+          <a:prstGeom prst="straightConnector1">
+            <a:avLst/>
+          </a:prstGeom>
+          <a:ln>
+            <a:solidFill>
+              <a:schemeClr val="tx1"/>
+            </a:solidFill>
+            <a:tailEnd type="triangle"/>
+          </a:ln>
+        </p:spPr>
+        <p:style>
+          <a:lnRef idx="2">
+            <a:schemeClr val="accent1"/>
+          </a:lnRef>
+          <a:fillRef idx="0">
+            <a:schemeClr val="accent1"/>
+          </a:fillRef>
+          <a:effectRef idx="1">
+            <a:schemeClr val="accent1"/>
+          </a:effectRef>
+          <a:fontRef idx="minor">
+            <a:schemeClr val="tx1"/>
+          </a:fontRef>
+        </p:style>
+      </p:cxnSp>
+      <p:sp>
+        <p:nvSpPr>
+          <p:cNvPr id="33" name="TextBox 32">
+            <a:extLst>
+              <a:ext uri="{FF2B5EF4-FFF2-40B4-BE49-F238E27FC236}">
+                <a16:creationId xmlns:a16="http://schemas.microsoft.com/office/drawing/2014/main" id="{A6DB8C2B-09E7-BEEA-4C23-78A752B67DBB}"/>
+              </a:ext>
+            </a:extLst>
+          </p:cNvPr>
+          <p:cNvSpPr txBox="1"/>
+          <p:nvPr/>
+        </p:nvSpPr>
+        <p:spPr>
+          <a:xfrm>
+            <a:off x="4334855" y="2121488"/>
+            <a:ext cx="783771" cy="369332"/>
+          </a:xfrm>
+          <a:prstGeom prst="rect">
+            <a:avLst/>
+          </a:prstGeom>
+          <a:noFill/>
+        </p:spPr>
+        <p:txBody>
+          <a:bodyPr wrap="square" rtlCol="0">
+            <a:spAutoFit/>
+          </a:bodyPr>
+          <a:lstStyle/>
+          <a:p>
+            <a:r>
+              <a:rPr lang="en-GB" dirty="0"/>
+              <a:t>ReLU</a:t>
+            </a:r>
+          </a:p>
+        </p:txBody>
+      </p:sp>
+    </p:spTree>
+    <p:extLst>
+      <p:ext uri="{BB962C8B-B14F-4D97-AF65-F5344CB8AC3E}">
+        <p14:creationId xmlns:p14="http://schemas.microsoft.com/office/powerpoint/2010/main" val="4249282133"/>
       </p:ext>
     </p:extLst>
   </p:cSld>

</xml_diff>